<commit_message>
Made Ani's changes to Gerard's ADASS poster
</commit_message>
<xml_diff>
--- a/posters/adass2017/GerardPosterA0_mar_bjs_mjr.pptx
+++ b/posters/adass2017/GerardPosterA0_mar_bjs_mjr.pptx
@@ -3760,7 +3760,7 @@
               <a:graphicData uri="http://schemas.openxmlformats.org/presentationml/2006/ole">
                 <mc:AlternateContent xmlns:mc="http://schemas.openxmlformats.org/markup-compatibility/2006">
                   <mc:Choice xmlns:v="urn:schemas-microsoft-com:vml" Requires="v">
-                    <p:oleObj spid="_x0000_s1190" name="Image" r:id="rId8" imgW="1828440" imgH="1117440" progId="Photoshop.Image.13">
+                    <p:oleObj spid="_x0000_s1194" name="Image" r:id="rId8" imgW="1828440" imgH="1117440" progId="Photoshop.Image.13">
                       <p:embed/>
                     </p:oleObj>
                   </mc:Choice>
@@ -3817,7 +3817,7 @@
               <a:graphicData uri="http://schemas.openxmlformats.org/presentationml/2006/ole">
                 <mc:AlternateContent xmlns:mc="http://schemas.openxmlformats.org/markup-compatibility/2006">
                   <mc:Choice xmlns:v="urn:schemas-microsoft-com:vml" Requires="v">
-                    <p:oleObj spid="_x0000_s1191" name="Image" r:id="rId10" imgW="1828440" imgH="1117440" progId="Photoshop.Image.13">
+                    <p:oleObj spid="_x0000_s1195" name="Image" r:id="rId10" imgW="1828440" imgH="1117440" progId="Photoshop.Image.13">
                       <p:embed/>
                     </p:oleObj>
                   </mc:Choice>
@@ -4995,7 +4995,7 @@
             <a:graphicData uri="http://schemas.openxmlformats.org/presentationml/2006/ole">
               <mc:AlternateContent xmlns:mc="http://schemas.openxmlformats.org/markup-compatibility/2006">
                 <mc:Choice xmlns:v="urn:schemas-microsoft-com:vml" Requires="v">
-                  <p:oleObj spid="_x0000_s1192" name="Image" r:id="rId12" imgW="4571280" imgH="1688760" progId="Photoshop.Image.13">
+                  <p:oleObj spid="_x0000_s1196" name="Image" r:id="rId12" imgW="4571280" imgH="1688760" progId="Photoshop.Image.13">
                     <p:embed/>
                   </p:oleObj>
                 </mc:Choice>
@@ -5079,7 +5079,7 @@
             <a:graphicData uri="http://schemas.openxmlformats.org/presentationml/2006/ole">
               <mc:AlternateContent xmlns:mc="http://schemas.openxmlformats.org/markup-compatibility/2006">
                 <mc:Choice xmlns:v="urn:schemas-microsoft-com:vml" Requires="v">
-                  <p:oleObj spid="_x0000_s1193" name="Image" r:id="rId15" imgW="1574280" imgH="1053720" progId="Photoshop.Image.13">
+                  <p:oleObj spid="_x0000_s1197" name="Image" r:id="rId15" imgW="1574280" imgH="1053720" progId="Photoshop.Image.13">
                     <p:embed/>
                   </p:oleObj>
                 </mc:Choice>
@@ -7195,7 +7195,7 @@
           <a:p>
             <a:r>
               <a:rPr lang="en-US" sz="4000" b="1" dirty="0"/>
-              <a:t>RACM is the Resource Access Control Management component of SciServer (http://www.sciserver.org), a system for providing advanced analysis capabilities to large astronomical and other scientific data sets.  </a:t>
+              <a:t>RACM is the Resource Access Control Management component of SciServer (http://www.sciserver.org), a system for advanced analysis in a collaborative environment for large scientific datasets.</a:t>
             </a:r>
           </a:p>
         </p:txBody>
@@ -7209,7 +7209,7 @@
         <p:spPr>
           <a:xfrm>
             <a:off x="634885" y="8237482"/>
-            <a:ext cx="11454442" cy="1938992"/>
+            <a:ext cx="11454442" cy="1323439"/>
           </a:xfrm>
           <a:prstGeom prst="rect">
             <a:avLst/>
@@ -7227,7 +7227,7 @@
           <a:p>
             <a:r>
               <a:rPr lang="en-US" sz="4000" b="1" dirty="0"/>
-              <a:t>RACM uses a flexible data model for representing who is allowed to do which actions on a particular resource.</a:t>
+              <a:t>RACM uses a flexible data model for representing who is allowed to do which actions on each resource.</a:t>
             </a:r>
           </a:p>
         </p:txBody>
@@ -7305,7 +7305,7 @@
             </a:pPr>
             <a:r>
               <a:rPr lang="en-US" sz="3600" b="1" dirty="0"/>
-              <a:t>Define and manage Users and Groups</a:t>
+              <a:t>Define and manage users and groups</a:t>
             </a:r>
           </a:p>
           <a:p>
@@ -7315,7 +7315,7 @@
             </a:pPr>
             <a:r>
               <a:rPr lang="en-US" sz="3600" b="1" dirty="0"/>
-              <a:t>Define and manage system Resources</a:t>
+              <a:t>Define and manage system resources</a:t>
             </a:r>
           </a:p>
           <a:p>
@@ -7325,7 +7325,7 @@
             </a:pPr>
             <a:r>
               <a:rPr lang="en-US" sz="3600" b="1" dirty="0"/>
-              <a:t>Define and manage access controls between Users and Resources</a:t>
+              <a:t>Define and manage access controls between users and resources</a:t>
             </a:r>
           </a:p>
           <a:p>
@@ -7345,7 +7345,7 @@
             </a:pPr>
             <a:r>
               <a:rPr lang="en-US" sz="3600" b="1" dirty="0"/>
-              <a:t>Support nested Groups</a:t>
+              <a:t>Support nested groups</a:t>
             </a:r>
           </a:p>
           <a:p>
@@ -7355,7 +7355,7 @@
             </a:pPr>
             <a:r>
               <a:rPr lang="en-US" sz="3600" b="1" dirty="0"/>
-              <a:t>Soon: Regions and Domains</a:t>
+              <a:t>Coming Soon: regions and domains</a:t>
             </a:r>
           </a:p>
         </p:txBody>
@@ -7433,7 +7433,7 @@
             </a:pPr>
             <a:r>
               <a:rPr lang="en-US" sz="3600" b="1" dirty="0"/>
-              <a:t>Workspaces for intuitive user implementation</a:t>
+              <a:t>Workspaces for intuitive user access</a:t>
             </a:r>
           </a:p>
         </p:txBody>
@@ -7485,7 +7485,7 @@
             </a:pPr>
             <a:r>
               <a:rPr lang="en-US" sz="3600" b="1" dirty="0"/>
-              <a:t>Abstract model allows new Resource types to be defined</a:t>
+              <a:t>Abstract model allows new resource types to be defined</a:t>
             </a:r>
           </a:p>
           <a:p>
@@ -7495,7 +7495,7 @@
             </a:pPr>
             <a:r>
               <a:rPr lang="en-US" sz="3600" b="1" dirty="0"/>
-              <a:t>Can be used by external applications as an Access Control Framework in itself</a:t>
+              <a:t>Can be used by external applications as an access control framework in itself</a:t>
             </a:r>
           </a:p>
         </p:txBody>
@@ -8162,7 +8162,7 @@
             </a:pPr>
             <a:r>
               <a:rPr lang="en-US" sz="3600" b="1" dirty="0"/>
-              <a:t>User created and managed Easily add Resources and Users</a:t>
+              <a:t>User created and managed</a:t>
             </a:r>
           </a:p>
           <a:p>
@@ -8172,13 +8172,18 @@
             </a:pPr>
             <a:r>
               <a:rPr lang="en-US" sz="3600" b="1" dirty="0"/>
-              <a:t>Shared workspace folder </a:t>
+              <a:t>Easy to add resources and users</a:t>
             </a:r>
+          </a:p>
+          <a:p>
+            <a:pPr marL="571500" indent="-571500">
+              <a:buFont typeface="Arial" panose="020B0604020202020204" pitchFamily="34" charset="0"/>
+              <a:buChar char="•"/>
+            </a:pPr>
             <a:r>
-              <a:rPr lang="en-US" sz="3600" b="1"/>
-              <a:t>and database</a:t>
+              <a:rPr lang="en-US" sz="3600" b="1" dirty="0"/>
+              <a:t>Shared workspace folder and database</a:t>
             </a:r>
-            <a:endParaRPr lang="en-US" sz="3600" b="1" dirty="0"/>
           </a:p>
           <a:p>
             <a:pPr marL="571500" indent="-571500">

</xml_diff>